<commit_message>
Update Dialer File notes with correct department mapping.
</commit_message>
<xml_diff>
--- a/doc/dialer-file.pptx
+++ b/doc/dialer-file.pptx
@@ -12,6 +12,10 @@
     <p:sldId id="262" r:id="rId6"/>
     <p:sldId id="259" r:id="rId7"/>
     <p:sldId id="264" r:id="rId8"/>
+    <p:sldId id="265" r:id="rId9"/>
+    <p:sldId id="267" r:id="rId10"/>
+    <p:sldId id="268" r:id="rId11"/>
+    <p:sldId id="269" r:id="rId12"/>
   </p:sldIdLst>
   <p:sldSz cx="12192000" cy="6858000"/>
   <p:notesSz cx="6858000" cy="9144000"/>
@@ -110,6 +114,11 @@
       </a:defRPr>
     </a:lvl9pPr>
   </p:defaultTextStyle>
+  <p:extLst>
+    <p:ext uri="{EFAFB233-063F-42B5-8137-9DF3F51BA10A}">
+      <p15:sldGuideLst xmlns:p15="http://schemas.microsoft.com/office/powerpoint/2012/main"/>
+    </p:ext>
+  </p:extLst>
 </p:presentation>
 </file>
 
@@ -260,7 +269,7 @@
           <a:p>
             <a:fld id="{14C5A6AA-3F8A-4532-8366-8AAC1F22E03C}" type="datetimeFigureOut">
               <a:rPr lang="en-US" smtClean="0"/>
-              <a:t>1/8/2024</a:t>
+              <a:t>1/10/2024</a:t>
             </a:fld>
             <a:endParaRPr lang="en-US"/>
           </a:p>
@@ -458,7 +467,7 @@
           <a:p>
             <a:fld id="{14C5A6AA-3F8A-4532-8366-8AAC1F22E03C}" type="datetimeFigureOut">
               <a:rPr lang="en-US" smtClean="0"/>
-              <a:t>1/8/2024</a:t>
+              <a:t>1/10/2024</a:t>
             </a:fld>
             <a:endParaRPr lang="en-US"/>
           </a:p>
@@ -666,7 +675,7 @@
           <a:p>
             <a:fld id="{14C5A6AA-3F8A-4532-8366-8AAC1F22E03C}" type="datetimeFigureOut">
               <a:rPr lang="en-US" smtClean="0"/>
-              <a:t>1/8/2024</a:t>
+              <a:t>1/10/2024</a:t>
             </a:fld>
             <a:endParaRPr lang="en-US"/>
           </a:p>
@@ -864,7 +873,7 @@
           <a:p>
             <a:fld id="{14C5A6AA-3F8A-4532-8366-8AAC1F22E03C}" type="datetimeFigureOut">
               <a:rPr lang="en-US" smtClean="0"/>
-              <a:t>1/8/2024</a:t>
+              <a:t>1/10/2024</a:t>
             </a:fld>
             <a:endParaRPr lang="en-US"/>
           </a:p>
@@ -1139,7 +1148,7 @@
           <a:p>
             <a:fld id="{14C5A6AA-3F8A-4532-8366-8AAC1F22E03C}" type="datetimeFigureOut">
               <a:rPr lang="en-US" smtClean="0"/>
-              <a:t>1/8/2024</a:t>
+              <a:t>1/10/2024</a:t>
             </a:fld>
             <a:endParaRPr lang="en-US"/>
           </a:p>
@@ -1404,7 +1413,7 @@
           <a:p>
             <a:fld id="{14C5A6AA-3F8A-4532-8366-8AAC1F22E03C}" type="datetimeFigureOut">
               <a:rPr lang="en-US" smtClean="0"/>
-              <a:t>1/8/2024</a:t>
+              <a:t>1/10/2024</a:t>
             </a:fld>
             <a:endParaRPr lang="en-US"/>
           </a:p>
@@ -1816,7 +1825,7 @@
           <a:p>
             <a:fld id="{14C5A6AA-3F8A-4532-8366-8AAC1F22E03C}" type="datetimeFigureOut">
               <a:rPr lang="en-US" smtClean="0"/>
-              <a:t>1/8/2024</a:t>
+              <a:t>1/10/2024</a:t>
             </a:fld>
             <a:endParaRPr lang="en-US"/>
           </a:p>
@@ -1957,7 +1966,7 @@
           <a:p>
             <a:fld id="{14C5A6AA-3F8A-4532-8366-8AAC1F22E03C}" type="datetimeFigureOut">
               <a:rPr lang="en-US" smtClean="0"/>
-              <a:t>1/8/2024</a:t>
+              <a:t>1/10/2024</a:t>
             </a:fld>
             <a:endParaRPr lang="en-US"/>
           </a:p>
@@ -2070,7 +2079,7 @@
           <a:p>
             <a:fld id="{14C5A6AA-3F8A-4532-8366-8AAC1F22E03C}" type="datetimeFigureOut">
               <a:rPr lang="en-US" smtClean="0"/>
-              <a:t>1/8/2024</a:t>
+              <a:t>1/10/2024</a:t>
             </a:fld>
             <a:endParaRPr lang="en-US"/>
           </a:p>
@@ -2381,7 +2390,7 @@
           <a:p>
             <a:fld id="{14C5A6AA-3F8A-4532-8366-8AAC1F22E03C}" type="datetimeFigureOut">
               <a:rPr lang="en-US" smtClean="0"/>
-              <a:t>1/8/2024</a:t>
+              <a:t>1/10/2024</a:t>
             </a:fld>
             <a:endParaRPr lang="en-US"/>
           </a:p>
@@ -2669,7 +2678,7 @@
           <a:p>
             <a:fld id="{14C5A6AA-3F8A-4532-8366-8AAC1F22E03C}" type="datetimeFigureOut">
               <a:rPr lang="en-US" smtClean="0"/>
-              <a:t>1/8/2024</a:t>
+              <a:t>1/10/2024</a:t>
             </a:fld>
             <a:endParaRPr lang="en-US"/>
           </a:p>
@@ -2910,7 +2919,7 @@
           <a:p>
             <a:fld id="{14C5A6AA-3F8A-4532-8366-8AAC1F22E03C}" type="datetimeFigureOut">
               <a:rPr lang="en-US" smtClean="0"/>
-              <a:t>1/8/2024</a:t>
+              <a:t>1/10/2024</a:t>
             </a:fld>
             <a:endParaRPr lang="en-US"/>
           </a:p>
@@ -3396,6 +3405,439 @@
 </p:sld>
 </file>
 
+<file path=ppt/slides/slide10.xml><?xml version="1.0" encoding="utf-8"?>
+<p:sld xmlns:a="http://schemas.openxmlformats.org/drawingml/2006/main" xmlns:r="http://schemas.openxmlformats.org/officeDocument/2006/relationships" xmlns:p="http://schemas.openxmlformats.org/presentationml/2006/main">
+  <p:cSld>
+    <p:spTree>
+      <p:nvGrpSpPr>
+        <p:cNvPr id="1" name=""/>
+        <p:cNvGrpSpPr/>
+        <p:nvPr/>
+      </p:nvGrpSpPr>
+      <p:grpSpPr>
+        <a:xfrm>
+          <a:off x="0" y="0"/>
+          <a:ext cx="0" cy="0"/>
+          <a:chOff x="0" y="0"/>
+          <a:chExt cx="0" cy="0"/>
+        </a:xfrm>
+      </p:grpSpPr>
+      <p:sp>
+        <p:nvSpPr>
+          <p:cNvPr id="2" name="Title 1">
+            <a:extLst>
+              <a:ext uri="{FF2B5EF4-FFF2-40B4-BE49-F238E27FC236}">
+                <a16:creationId xmlns:a16="http://schemas.microsoft.com/office/drawing/2014/main" id="{874BD864-7FED-44B8-9DF9-FEB9C884F66E}"/>
+              </a:ext>
+            </a:extLst>
+          </p:cNvPr>
+          <p:cNvSpPr>
+            <a:spLocks noGrp="1"/>
+          </p:cNvSpPr>
+          <p:nvPr>
+            <p:ph type="title"/>
+          </p:nvPr>
+        </p:nvSpPr>
+        <p:spPr/>
+        <p:txBody>
+          <a:bodyPr/>
+          <a:lstStyle/>
+          <a:p>
+            <a:r>
+              <a:rPr lang="en-US" dirty="0"/>
+              <a:t>Output – Directory Format</a:t>
+            </a:r>
+          </a:p>
+        </p:txBody>
+      </p:sp>
+      <p:sp>
+        <p:nvSpPr>
+          <p:cNvPr id="6" name="TextBox 5">
+            <a:extLst>
+              <a:ext uri="{FF2B5EF4-FFF2-40B4-BE49-F238E27FC236}">
+                <a16:creationId xmlns:a16="http://schemas.microsoft.com/office/drawing/2014/main" id="{80DA8361-E657-4113-969F-4709C71E5FCC}"/>
+              </a:ext>
+            </a:extLst>
+          </p:cNvPr>
+          <p:cNvSpPr txBox="1"/>
+          <p:nvPr/>
+        </p:nvSpPr>
+        <p:spPr>
+          <a:xfrm>
+            <a:off x="564542" y="1690688"/>
+            <a:ext cx="9668787" cy="1754326"/>
+          </a:xfrm>
+          <a:prstGeom prst="rect">
+            <a:avLst/>
+          </a:prstGeom>
+          <a:noFill/>
+        </p:spPr>
+        <p:txBody>
+          <a:bodyPr wrap="square" rtlCol="0">
+            <a:spAutoFit/>
+          </a:bodyPr>
+          <a:lstStyle/>
+          <a:p>
+            <a:r>
+              <a:rPr lang="en-US" b="1" i="1" dirty="0"/>
+              <a:t>TEAM_DOW-HOURWINDOW_PHONETYPE</a:t>
+            </a:r>
+            <a:r>
+              <a:rPr lang="en-US" i="1" dirty="0"/>
+              <a:t>, e.g. HEALTHCARE_1MON-1000_CLTIPA</a:t>
+            </a:r>
+          </a:p>
+          <a:p>
+            <a:endParaRPr lang="en-US" i="1" dirty="0"/>
+          </a:p>
+          <a:p>
+            <a:pPr marL="285750" indent="-285750">
+              <a:buFont typeface="Arial" panose="020B0604020202020204" pitchFamily="34" charset="0"/>
+              <a:buChar char="•"/>
+            </a:pPr>
+            <a:r>
+              <a:rPr lang="en-US" b="1" i="1" dirty="0"/>
+              <a:t>TEAM: 		</a:t>
+            </a:r>
+            <a:r>
+              <a:rPr lang="en-US" dirty="0"/>
+              <a:t>See Next Slide</a:t>
+            </a:r>
+          </a:p>
+          <a:p>
+            <a:pPr marL="285750" indent="-285750">
+              <a:buFont typeface="Arial" panose="020B0604020202020204" pitchFamily="34" charset="0"/>
+              <a:buChar char="•"/>
+            </a:pPr>
+            <a:r>
+              <a:rPr lang="en-US" b="1" i="1" dirty="0"/>
+              <a:t>DOW:</a:t>
+            </a:r>
+            <a:r>
+              <a:rPr lang="en-US" dirty="0"/>
+              <a:t> 			1Mon, 2Tue, 3Wed, 4Thu, 5Fri</a:t>
+            </a:r>
+          </a:p>
+          <a:p>
+            <a:pPr marL="285750" indent="-285750">
+              <a:buFont typeface="Arial" panose="020B0604020202020204" pitchFamily="34" charset="0"/>
+              <a:buChar char="•"/>
+            </a:pPr>
+            <a:r>
+              <a:rPr lang="en-US" b="1" i="1" dirty="0"/>
+              <a:t>HOURWINDOW:</a:t>
+            </a:r>
+            <a:r>
+              <a:rPr lang="en-US" dirty="0"/>
+              <a:t> 	0700, 1000, 1200, 1300, 1600</a:t>
+            </a:r>
+          </a:p>
+          <a:p>
+            <a:pPr marL="285750" indent="-285750">
+              <a:buFont typeface="Arial" panose="020B0604020202020204" pitchFamily="34" charset="0"/>
+              <a:buChar char="•"/>
+            </a:pPr>
+            <a:r>
+              <a:rPr lang="en-US" b="1" i="1" dirty="0"/>
+              <a:t>PHONETYPE (any of):	</a:t>
+            </a:r>
+            <a:r>
+              <a:rPr lang="en-US" dirty="0"/>
+              <a:t>CLTAUTH, CLTIPA, DOAUTH, DOIPA, DOLAND, LAND</a:t>
+            </a:r>
+          </a:p>
+        </p:txBody>
+      </p:sp>
+    </p:spTree>
+    <p:extLst>
+      <p:ext uri="{BB962C8B-B14F-4D97-AF65-F5344CB8AC3E}">
+        <p14:creationId xmlns:p14="http://schemas.microsoft.com/office/powerpoint/2010/main" val="1541970730"/>
+      </p:ext>
+    </p:extLst>
+  </p:cSld>
+  <p:clrMapOvr>
+    <a:masterClrMapping/>
+  </p:clrMapOvr>
+</p:sld>
+</file>
+
+<file path=ppt/slides/slide11.xml><?xml version="1.0" encoding="utf-8"?>
+<p:sld xmlns:a="http://schemas.openxmlformats.org/drawingml/2006/main" xmlns:r="http://schemas.openxmlformats.org/officeDocument/2006/relationships" xmlns:p="http://schemas.openxmlformats.org/presentationml/2006/main">
+  <p:cSld>
+    <p:spTree>
+      <p:nvGrpSpPr>
+        <p:cNvPr id="1" name=""/>
+        <p:cNvGrpSpPr/>
+        <p:nvPr/>
+      </p:nvGrpSpPr>
+      <p:grpSpPr>
+        <a:xfrm>
+          <a:off x="0" y="0"/>
+          <a:ext cx="0" cy="0"/>
+          <a:chOff x="0" y="0"/>
+          <a:chExt cx="0" cy="0"/>
+        </a:xfrm>
+      </p:grpSpPr>
+      <p:sp>
+        <p:nvSpPr>
+          <p:cNvPr id="2" name="Title 1">
+            <a:extLst>
+              <a:ext uri="{FF2B5EF4-FFF2-40B4-BE49-F238E27FC236}">
+                <a16:creationId xmlns:a16="http://schemas.microsoft.com/office/drawing/2014/main" id="{4FD8E55F-996E-4A7F-B047-6E6C42936371}"/>
+              </a:ext>
+            </a:extLst>
+          </p:cNvPr>
+          <p:cNvSpPr>
+            <a:spLocks noGrp="1"/>
+          </p:cNvSpPr>
+          <p:nvPr>
+            <p:ph type="title"/>
+          </p:nvPr>
+        </p:nvSpPr>
+        <p:spPr/>
+        <p:txBody>
+          <a:bodyPr/>
+          <a:lstStyle/>
+          <a:p>
+            <a:r>
+              <a:rPr lang="en-US" dirty="0"/>
+              <a:t>Output – Directory Format</a:t>
+            </a:r>
+          </a:p>
+        </p:txBody>
+      </p:sp>
+      <p:sp>
+        <p:nvSpPr>
+          <p:cNvPr id="3" name="Content Placeholder 2">
+            <a:extLst>
+              <a:ext uri="{FF2B5EF4-FFF2-40B4-BE49-F238E27FC236}">
+                <a16:creationId xmlns:a16="http://schemas.microsoft.com/office/drawing/2014/main" id="{F97879EB-9B9F-409F-A732-E5DA42FB170D}"/>
+              </a:ext>
+            </a:extLst>
+          </p:cNvPr>
+          <p:cNvSpPr>
+            <a:spLocks noGrp="1"/>
+          </p:cNvSpPr>
+          <p:nvPr>
+            <p:ph idx="1"/>
+          </p:nvPr>
+        </p:nvSpPr>
+        <p:spPr/>
+        <p:txBody>
+          <a:bodyPr>
+            <a:normAutofit fontScale="47500" lnSpcReduction="20000"/>
+          </a:bodyPr>
+          <a:lstStyle/>
+          <a:p>
+            <a:pPr marL="0" indent="0">
+              <a:buNone/>
+            </a:pPr>
+            <a:r>
+              <a:rPr lang="en-US" b="1" i="1" dirty="0"/>
+              <a:t>TEAM</a:t>
+            </a:r>
+          </a:p>
+          <a:p>
+            <a:r>
+              <a:rPr lang="en-US" dirty="0"/>
+              <a:t>Carol</a:t>
+            </a:r>
+            <a:endParaRPr lang="en-US" b="1" i="1" dirty="0"/>
+          </a:p>
+          <a:p>
+            <a:pPr lvl="1"/>
+            <a:r>
+              <a:rPr lang="en-US" b="1" i="1" dirty="0"/>
+              <a:t>DC</a:t>
+            </a:r>
+          </a:p>
+          <a:p>
+            <a:pPr lvl="1"/>
+            <a:r>
+              <a:rPr lang="en-US" b="1" i="1" dirty="0"/>
+              <a:t>COC Parking</a:t>
+            </a:r>
+          </a:p>
+          <a:p>
+            <a:pPr lvl="1"/>
+            <a:r>
+              <a:rPr lang="en-US" b="1" i="1" dirty="0"/>
+              <a:t>Toll </a:t>
+            </a:r>
+            <a:r>
+              <a:rPr lang="en-US" i="1" dirty="0"/>
+              <a:t>(ERC, PA Turnpike, eventually OTA too)</a:t>
+            </a:r>
+          </a:p>
+          <a:p>
+            <a:pPr lvl="1"/>
+            <a:r>
+              <a:rPr lang="en-US" b="1" i="1" dirty="0"/>
+              <a:t>Municipal </a:t>
+            </a:r>
+            <a:r>
+              <a:rPr lang="en-US" i="1" dirty="0"/>
+              <a:t>(</a:t>
+            </a:r>
+            <a:r>
+              <a:rPr lang="en-US" i="1" dirty="0" err="1"/>
+              <a:t>Conduents</a:t>
+            </a:r>
+            <a:r>
+              <a:rPr lang="en-US" i="1" dirty="0"/>
+              <a:t>, OKC Parking, Philly Parking/Water/</a:t>
+            </a:r>
+            <a:r>
+              <a:rPr lang="en-US" i="1" dirty="0" err="1"/>
+              <a:t>Misc</a:t>
+            </a:r>
+            <a:r>
+              <a:rPr lang="en-US" i="1" dirty="0"/>
+              <a:t>, Seattle, SF MTA)</a:t>
+            </a:r>
+          </a:p>
+          <a:p>
+            <a:pPr lvl="1"/>
+            <a:r>
+              <a:rPr lang="en-US" b="1" i="1" dirty="0"/>
+              <a:t>COC EMS</a:t>
+            </a:r>
+          </a:p>
+          <a:p>
+            <a:pPr lvl="1"/>
+            <a:r>
+              <a:rPr lang="en-US" b="1" i="1" dirty="0"/>
+              <a:t>EMSs </a:t>
+            </a:r>
+            <a:r>
+              <a:rPr lang="en-US" i="1" dirty="0"/>
+              <a:t>(Det, SF EMS)</a:t>
+            </a:r>
+          </a:p>
+          <a:p>
+            <a:pPr lvl="1"/>
+            <a:r>
+              <a:rPr lang="en-US" b="1" i="1" dirty="0"/>
+              <a:t>UTL </a:t>
+            </a:r>
+            <a:r>
+              <a:rPr lang="en-US" i="1" dirty="0"/>
+              <a:t>(CE 3P, DTE 3P, </a:t>
+            </a:r>
+            <a:r>
+              <a:rPr lang="en-US" i="1" dirty="0" err="1"/>
+              <a:t>Evergy</a:t>
+            </a:r>
+            <a:r>
+              <a:rPr lang="en-US" i="1" dirty="0"/>
+              <a:t>, Nicor)</a:t>
+            </a:r>
+          </a:p>
+          <a:p>
+            <a:pPr lvl="1"/>
+            <a:r>
+              <a:rPr lang="en-US" b="1" i="1" dirty="0"/>
+              <a:t>DTE EOP</a:t>
+            </a:r>
+          </a:p>
+          <a:p>
+            <a:r>
+              <a:rPr lang="en-US" dirty="0"/>
+              <a:t>Greg</a:t>
+            </a:r>
+          </a:p>
+          <a:p>
+            <a:pPr lvl="1"/>
+            <a:r>
+              <a:rPr lang="en-US" b="1" i="1" dirty="0"/>
+              <a:t>MDA</a:t>
+            </a:r>
+          </a:p>
+          <a:p>
+            <a:pPr lvl="1"/>
+            <a:r>
+              <a:rPr lang="en-US" b="1" i="1" dirty="0"/>
+              <a:t>State of NY (WCMC, Columbia Doctor &amp; Dental , Mount Sinai)</a:t>
+            </a:r>
+          </a:p>
+          <a:p>
+            <a:pPr lvl="1"/>
+            <a:r>
+              <a:rPr lang="en-US" b="1" i="1" dirty="0"/>
+              <a:t>Everything Else</a:t>
+            </a:r>
+          </a:p>
+          <a:p>
+            <a:r>
+              <a:rPr lang="en-US" dirty="0"/>
+              <a:t>Fatima</a:t>
+            </a:r>
+          </a:p>
+          <a:p>
+            <a:pPr lvl="1"/>
+            <a:r>
+              <a:rPr lang="en-US" b="1" i="1" dirty="0"/>
+              <a:t>State</a:t>
+            </a:r>
+          </a:p>
+          <a:p>
+            <a:pPr lvl="2"/>
+            <a:r>
+              <a:rPr lang="en-US" b="1" i="1" dirty="0"/>
+              <a:t>ASH List - KDOR</a:t>
+            </a:r>
+          </a:p>
+          <a:p>
+            <a:pPr lvl="2"/>
+            <a:r>
+              <a:rPr lang="en-US" b="1" i="1" dirty="0"/>
+              <a:t>HH List – everyone else</a:t>
+            </a:r>
+          </a:p>
+          <a:p>
+            <a:pPr lvl="1"/>
+            <a:r>
+              <a:rPr lang="en-US" b="1" i="1" dirty="0"/>
+              <a:t>County (minus Vegas 1P)</a:t>
+            </a:r>
+          </a:p>
+          <a:p>
+            <a:pPr lvl="1"/>
+            <a:r>
+              <a:rPr lang="en-US" b="1" i="1" dirty="0"/>
+              <a:t>Vegas 1P</a:t>
+            </a:r>
+          </a:p>
+          <a:p>
+            <a:pPr lvl="1"/>
+            <a:r>
+              <a:rPr lang="en-US" b="1" i="1" dirty="0"/>
+              <a:t>Outsourcing – Carle OBs</a:t>
+            </a:r>
+          </a:p>
+          <a:p>
+            <a:pPr lvl="1"/>
+            <a:r>
+              <a:rPr lang="en-US" b="1" i="1" dirty="0"/>
+              <a:t>DE</a:t>
+            </a:r>
+            <a:endParaRPr lang="en-US" dirty="0"/>
+          </a:p>
+        </p:txBody>
+      </p:sp>
+    </p:spTree>
+    <p:extLst>
+      <p:ext uri="{BB962C8B-B14F-4D97-AF65-F5344CB8AC3E}">
+        <p14:creationId xmlns:p14="http://schemas.microsoft.com/office/powerpoint/2010/main" val="2525724130"/>
+      </p:ext>
+    </p:extLst>
+  </p:cSld>
+  <p:clrMapOvr>
+    <a:masterClrMapping/>
+  </p:clrMapOvr>
+</p:sld>
+</file>
+
 <file path=ppt/slides/slide2.xml><?xml version="1.0" encoding="utf-8"?>
 <p:sld xmlns:a="http://schemas.openxmlformats.org/drawingml/2006/main" xmlns:r="http://schemas.openxmlformats.org/officeDocument/2006/relationships" xmlns:p="http://schemas.openxmlformats.org/presentationml/2006/main">
   <p:cSld>
@@ -5012,6 +5454,616 @@
     <p:extLst>
       <p:ext uri="{BB962C8B-B14F-4D97-AF65-F5344CB8AC3E}">
         <p14:creationId xmlns:p14="http://schemas.microsoft.com/office/powerpoint/2010/main" val="609379834"/>
+      </p:ext>
+    </p:extLst>
+  </p:cSld>
+  <p:clrMapOvr>
+    <a:masterClrMapping/>
+  </p:clrMapOvr>
+</p:sld>
+</file>
+
+<file path=ppt/slides/slide8.xml><?xml version="1.0" encoding="utf-8"?>
+<p:sld xmlns:a="http://schemas.openxmlformats.org/drawingml/2006/main" xmlns:r="http://schemas.openxmlformats.org/officeDocument/2006/relationships" xmlns:p="http://schemas.openxmlformats.org/presentationml/2006/main">
+  <p:cSld>
+    <p:spTree>
+      <p:nvGrpSpPr>
+        <p:cNvPr id="1" name=""/>
+        <p:cNvGrpSpPr/>
+        <p:nvPr/>
+      </p:nvGrpSpPr>
+      <p:grpSpPr>
+        <a:xfrm>
+          <a:off x="0" y="0"/>
+          <a:ext cx="0" cy="0"/>
+          <a:chOff x="0" y="0"/>
+          <a:chExt cx="0" cy="0"/>
+        </a:xfrm>
+      </p:grpSpPr>
+      <p:sp>
+        <p:nvSpPr>
+          <p:cNvPr id="2" name="Title 1">
+            <a:extLst>
+              <a:ext uri="{FF2B5EF4-FFF2-40B4-BE49-F238E27FC236}">
+                <a16:creationId xmlns:a16="http://schemas.microsoft.com/office/drawing/2014/main" id="{B569487A-C5DC-4658-B2EF-108840BA0F17}"/>
+              </a:ext>
+            </a:extLst>
+          </p:cNvPr>
+          <p:cNvSpPr>
+            <a:spLocks noGrp="1"/>
+          </p:cNvSpPr>
+          <p:nvPr>
+            <p:ph type="ctrTitle"/>
+          </p:nvPr>
+        </p:nvSpPr>
+        <p:spPr/>
+        <p:txBody>
+          <a:bodyPr/>
+          <a:lstStyle/>
+          <a:p>
+            <a:r>
+              <a:rPr lang="en-US" dirty="0"/>
+              <a:t>Hermes Dialer File – Ops</a:t>
+            </a:r>
+          </a:p>
+        </p:txBody>
+      </p:sp>
+      <p:sp>
+        <p:nvSpPr>
+          <p:cNvPr id="3" name="Subtitle 2">
+            <a:extLst>
+              <a:ext uri="{FF2B5EF4-FFF2-40B4-BE49-F238E27FC236}">
+                <a16:creationId xmlns:a16="http://schemas.microsoft.com/office/drawing/2014/main" id="{27B25189-DFE9-406F-B3A9-3A98A249D7EF}"/>
+              </a:ext>
+            </a:extLst>
+          </p:cNvPr>
+          <p:cNvSpPr>
+            <a:spLocks noGrp="1"/>
+          </p:cNvSpPr>
+          <p:nvPr>
+            <p:ph type="subTitle" idx="1"/>
+          </p:nvPr>
+        </p:nvSpPr>
+        <p:spPr/>
+        <p:txBody>
+          <a:bodyPr/>
+          <a:lstStyle/>
+          <a:p>
+            <a:r>
+              <a:rPr lang="en-US" dirty="0"/>
+              <a:t>2024-01-08</a:t>
+            </a:r>
+          </a:p>
+        </p:txBody>
+      </p:sp>
+    </p:spTree>
+    <p:extLst>
+      <p:ext uri="{BB962C8B-B14F-4D97-AF65-F5344CB8AC3E}">
+        <p14:creationId xmlns:p14="http://schemas.microsoft.com/office/powerpoint/2010/main" val="2259231583"/>
+      </p:ext>
+    </p:extLst>
+  </p:cSld>
+  <p:clrMapOvr>
+    <a:masterClrMapping/>
+  </p:clrMapOvr>
+</p:sld>
+</file>
+
+<file path=ppt/slides/slide9.xml><?xml version="1.0" encoding="utf-8"?>
+<p:sld xmlns:a="http://schemas.openxmlformats.org/drawingml/2006/main" xmlns:r="http://schemas.openxmlformats.org/officeDocument/2006/relationships" xmlns:p="http://schemas.openxmlformats.org/presentationml/2006/main">
+  <p:cSld>
+    <p:spTree>
+      <p:nvGrpSpPr>
+        <p:cNvPr id="1" name=""/>
+        <p:cNvGrpSpPr/>
+        <p:nvPr/>
+      </p:nvGrpSpPr>
+      <p:grpSpPr>
+        <a:xfrm>
+          <a:off x="0" y="0"/>
+          <a:ext cx="0" cy="0"/>
+          <a:chOff x="0" y="0"/>
+          <a:chExt cx="0" cy="0"/>
+        </a:xfrm>
+      </p:grpSpPr>
+      <p:sp>
+        <p:nvSpPr>
+          <p:cNvPr id="2" name="Title 1">
+            <a:extLst>
+              <a:ext uri="{FF2B5EF4-FFF2-40B4-BE49-F238E27FC236}">
+                <a16:creationId xmlns:a16="http://schemas.microsoft.com/office/drawing/2014/main" id="{43032DC0-9AF5-425D-B1C0-E38F6B4AE0EF}"/>
+              </a:ext>
+            </a:extLst>
+          </p:cNvPr>
+          <p:cNvSpPr>
+            <a:spLocks noGrp="1"/>
+          </p:cNvSpPr>
+          <p:nvPr>
+            <p:ph type="title"/>
+          </p:nvPr>
+        </p:nvSpPr>
+        <p:spPr/>
+        <p:txBody>
+          <a:bodyPr/>
+          <a:lstStyle/>
+          <a:p>
+            <a:r>
+              <a:rPr lang="en-US" dirty="0"/>
+              <a:t>Logic Overview</a:t>
+            </a:r>
+          </a:p>
+        </p:txBody>
+      </p:sp>
+      <p:sp>
+        <p:nvSpPr>
+          <p:cNvPr id="4" name="Rectangle 3">
+            <a:extLst>
+              <a:ext uri="{FF2B5EF4-FFF2-40B4-BE49-F238E27FC236}">
+                <a16:creationId xmlns:a16="http://schemas.microsoft.com/office/drawing/2014/main" id="{A2BF8FFE-CF13-4174-825B-B584DA285813}"/>
+              </a:ext>
+            </a:extLst>
+          </p:cNvPr>
+          <p:cNvSpPr/>
+          <p:nvPr/>
+        </p:nvSpPr>
+        <p:spPr>
+          <a:xfrm>
+            <a:off x="878618" y="2514600"/>
+            <a:ext cx="2266122" cy="914400"/>
+          </a:xfrm>
+          <a:prstGeom prst="rect">
+            <a:avLst/>
+          </a:prstGeom>
+        </p:spPr>
+        <p:style>
+          <a:lnRef idx="2">
+            <a:schemeClr val="accent1">
+              <a:shade val="50000"/>
+            </a:schemeClr>
+          </a:lnRef>
+          <a:fillRef idx="1">
+            <a:schemeClr val="accent1"/>
+          </a:fillRef>
+          <a:effectRef idx="0">
+            <a:schemeClr val="accent1"/>
+          </a:effectRef>
+          <a:fontRef idx="minor">
+            <a:schemeClr val="lt1"/>
+          </a:fontRef>
+        </p:style>
+        <p:txBody>
+          <a:bodyPr rtlCol="0" anchor="ctr"/>
+          <a:lstStyle/>
+          <a:p>
+            <a:pPr algn="ctr"/>
+            <a:r>
+              <a:rPr lang="en-US" dirty="0"/>
+              <a:t>Choose Best Phone Number per Packet</a:t>
+            </a:r>
+          </a:p>
+        </p:txBody>
+      </p:sp>
+      <p:sp>
+        <p:nvSpPr>
+          <p:cNvPr id="5" name="TextBox 4">
+            <a:extLst>
+              <a:ext uri="{FF2B5EF4-FFF2-40B4-BE49-F238E27FC236}">
+                <a16:creationId xmlns:a16="http://schemas.microsoft.com/office/drawing/2014/main" id="{58A88854-BC01-4B4D-9E60-DA962300C064}"/>
+              </a:ext>
+            </a:extLst>
+          </p:cNvPr>
+          <p:cNvSpPr txBox="1"/>
+          <p:nvPr/>
+        </p:nvSpPr>
+        <p:spPr>
+          <a:xfrm>
+            <a:off x="564542" y="3663118"/>
+            <a:ext cx="2894275" cy="3293209"/>
+          </a:xfrm>
+          <a:prstGeom prst="rect">
+            <a:avLst/>
+          </a:prstGeom>
+          <a:noFill/>
+        </p:spPr>
+        <p:txBody>
+          <a:bodyPr wrap="square" rtlCol="0">
+            <a:spAutoFit/>
+          </a:bodyPr>
+          <a:lstStyle/>
+          <a:p>
+            <a:pPr marL="285750" indent="-285750">
+              <a:buFont typeface="Arial" panose="020B0604020202020204" pitchFamily="34" charset="0"/>
+              <a:buChar char="•"/>
+            </a:pPr>
+            <a:r>
+              <a:rPr lang="en-US" sz="1600" dirty="0"/>
+              <a:t>Determine Selection </a:t>
+            </a:r>
+            <a:r>
+              <a:rPr lang="en-US" sz="1600" b="1" i="1" dirty="0">
+                <a:solidFill>
+                  <a:schemeClr val="accent2"/>
+                </a:solidFill>
+              </a:rPr>
+              <a:t>Chance</a:t>
+            </a:r>
+            <a:r>
+              <a:rPr lang="en-US" sz="1600" dirty="0"/>
+              <a:t> based on history actions</a:t>
+            </a:r>
+          </a:p>
+          <a:p>
+            <a:pPr marL="742950" lvl="1" indent="-285750">
+              <a:buFont typeface="Arial" panose="020B0604020202020204" pitchFamily="34" charset="0"/>
+              <a:buChar char="•"/>
+            </a:pPr>
+            <a:r>
+              <a:rPr lang="en-US" sz="1600" dirty="0"/>
+              <a:t>Good: RPCs, IBs, Immediate Payment</a:t>
+            </a:r>
+          </a:p>
+          <a:p>
+            <a:pPr marL="742950" lvl="1" indent="-285750">
+              <a:buFont typeface="Arial" panose="020B0604020202020204" pitchFamily="34" charset="0"/>
+              <a:buChar char="•"/>
+            </a:pPr>
+            <a:r>
+              <a:rPr lang="en-US" sz="1600" dirty="0"/>
+              <a:t>Bad: Carrier Errors on Texts/</a:t>
+            </a:r>
+            <a:r>
+              <a:rPr lang="en-US" sz="1600" dirty="0" err="1"/>
+              <a:t>VoApps</a:t>
+            </a:r>
+            <a:endParaRPr lang="en-US" sz="1600" dirty="0"/>
+          </a:p>
+          <a:p>
+            <a:pPr marL="742950" lvl="1" indent="-285750">
+              <a:buFont typeface="Arial" panose="020B0604020202020204" pitchFamily="34" charset="0"/>
+              <a:buChar char="•"/>
+            </a:pPr>
+            <a:r>
+              <a:rPr lang="en-US" sz="1600" dirty="0"/>
+              <a:t>Neutral: No Answer on Dialer, Sent Text/</a:t>
+            </a:r>
+            <a:r>
+              <a:rPr lang="en-US" sz="1600" dirty="0" err="1"/>
+              <a:t>VoApp</a:t>
+            </a:r>
+            <a:r>
+              <a:rPr lang="en-US" sz="1600" dirty="0"/>
+              <a:t> but no payment</a:t>
+            </a:r>
+          </a:p>
+          <a:p>
+            <a:pPr lvl="1"/>
+            <a:endParaRPr lang="en-US" sz="1600" dirty="0"/>
+          </a:p>
+          <a:p>
+            <a:pPr marL="285750" indent="-285750">
+              <a:buFont typeface="Arial" panose="020B0604020202020204" pitchFamily="34" charset="0"/>
+              <a:buChar char="•"/>
+            </a:pPr>
+            <a:r>
+              <a:rPr lang="en-US" sz="1600" dirty="0"/>
+              <a:t>Preference for CLTAUTH, CLTIPA, LAND</a:t>
+            </a:r>
+          </a:p>
+          <a:p>
+            <a:pPr marL="285750" indent="-285750">
+              <a:buFont typeface="Arial" panose="020B0604020202020204" pitchFamily="34" charset="0"/>
+              <a:buChar char="•"/>
+            </a:pPr>
+            <a:endParaRPr lang="en-US" sz="1600" dirty="0"/>
+          </a:p>
+        </p:txBody>
+      </p:sp>
+      <p:sp>
+        <p:nvSpPr>
+          <p:cNvPr id="6" name="Rectangle 5">
+            <a:extLst>
+              <a:ext uri="{FF2B5EF4-FFF2-40B4-BE49-F238E27FC236}">
+                <a16:creationId xmlns:a16="http://schemas.microsoft.com/office/drawing/2014/main" id="{0AE49E0E-8A65-4ADF-9673-DB7E705CFFEB}"/>
+              </a:ext>
+            </a:extLst>
+          </p:cNvPr>
+          <p:cNvSpPr/>
+          <p:nvPr/>
+        </p:nvSpPr>
+        <p:spPr>
+          <a:xfrm>
+            <a:off x="4545495" y="2514600"/>
+            <a:ext cx="2266122" cy="914400"/>
+          </a:xfrm>
+          <a:prstGeom prst="rect">
+            <a:avLst/>
+          </a:prstGeom>
+        </p:spPr>
+        <p:style>
+          <a:lnRef idx="2">
+            <a:schemeClr val="accent1">
+              <a:shade val="50000"/>
+            </a:schemeClr>
+          </a:lnRef>
+          <a:fillRef idx="1">
+            <a:schemeClr val="accent1"/>
+          </a:fillRef>
+          <a:effectRef idx="0">
+            <a:schemeClr val="accent1"/>
+          </a:effectRef>
+          <a:fontRef idx="minor">
+            <a:schemeClr val="lt1"/>
+          </a:fontRef>
+        </p:style>
+        <p:txBody>
+          <a:bodyPr rtlCol="0" anchor="ctr"/>
+          <a:lstStyle/>
+          <a:p>
+            <a:pPr algn="ctr"/>
+            <a:r>
+              <a:rPr lang="en-US" dirty="0"/>
+              <a:t>Choose Best Packets</a:t>
+            </a:r>
+          </a:p>
+        </p:txBody>
+      </p:sp>
+      <p:sp>
+        <p:nvSpPr>
+          <p:cNvPr id="9" name="TextBox 8">
+            <a:extLst>
+              <a:ext uri="{FF2B5EF4-FFF2-40B4-BE49-F238E27FC236}">
+                <a16:creationId xmlns:a16="http://schemas.microsoft.com/office/drawing/2014/main" id="{A3C2CB19-2A2E-4F98-A1F2-75F56A4D93DD}"/>
+              </a:ext>
+            </a:extLst>
+          </p:cNvPr>
+          <p:cNvSpPr txBox="1"/>
+          <p:nvPr/>
+        </p:nvSpPr>
+        <p:spPr>
+          <a:xfrm>
+            <a:off x="4231419" y="3663118"/>
+            <a:ext cx="2894275" cy="1323439"/>
+          </a:xfrm>
+          <a:prstGeom prst="rect">
+            <a:avLst/>
+          </a:prstGeom>
+          <a:noFill/>
+        </p:spPr>
+        <p:txBody>
+          <a:bodyPr wrap="square" rtlCol="0">
+            <a:spAutoFit/>
+          </a:bodyPr>
+          <a:lstStyle/>
+          <a:p>
+            <a:pPr marL="285750" indent="-285750">
+              <a:buFont typeface="Arial" panose="020B0604020202020204" pitchFamily="34" charset="0"/>
+              <a:buChar char="•"/>
+            </a:pPr>
+            <a:r>
+              <a:rPr lang="en-US" sz="1600" dirty="0"/>
+              <a:t>Calculate score</a:t>
+            </a:r>
+          </a:p>
+          <a:p>
+            <a:pPr marL="285750" indent="-285750">
+              <a:buFont typeface="Arial" panose="020B0604020202020204" pitchFamily="34" charset="0"/>
+              <a:buChar char="•"/>
+            </a:pPr>
+            <a:r>
+              <a:rPr lang="en-US" sz="1600" dirty="0"/>
+              <a:t>Set volume target by Team</a:t>
+            </a:r>
+          </a:p>
+          <a:p>
+            <a:endParaRPr lang="en-US" sz="1600" dirty="0"/>
+          </a:p>
+          <a:p>
+            <a:pPr marL="285750" indent="-285750">
+              <a:buFont typeface="Arial" panose="020B0604020202020204" pitchFamily="34" charset="0"/>
+              <a:buChar char="•"/>
+            </a:pPr>
+            <a:r>
+              <a:rPr lang="en-US" sz="1600" dirty="0"/>
+              <a:t>Take N best scores (packets)</a:t>
+            </a:r>
+          </a:p>
+          <a:p>
+            <a:pPr marL="285750" indent="-285750">
+              <a:buFont typeface="Arial" panose="020B0604020202020204" pitchFamily="34" charset="0"/>
+              <a:buChar char="•"/>
+            </a:pPr>
+            <a:endParaRPr lang="en-US" sz="1600" dirty="0"/>
+          </a:p>
+        </p:txBody>
+      </p:sp>
+      <p:sp>
+        <p:nvSpPr>
+          <p:cNvPr id="10" name="Rectangle 9">
+            <a:extLst>
+              <a:ext uri="{FF2B5EF4-FFF2-40B4-BE49-F238E27FC236}">
+                <a16:creationId xmlns:a16="http://schemas.microsoft.com/office/drawing/2014/main" id="{A4D840FC-D986-4036-B963-6C321F51447B}"/>
+              </a:ext>
+            </a:extLst>
+          </p:cNvPr>
+          <p:cNvSpPr/>
+          <p:nvPr/>
+        </p:nvSpPr>
+        <p:spPr>
+          <a:xfrm>
+            <a:off x="8526449" y="2514600"/>
+            <a:ext cx="2266122" cy="914400"/>
+          </a:xfrm>
+          <a:prstGeom prst="rect">
+            <a:avLst/>
+          </a:prstGeom>
+        </p:spPr>
+        <p:style>
+          <a:lnRef idx="2">
+            <a:schemeClr val="accent1">
+              <a:shade val="50000"/>
+            </a:schemeClr>
+          </a:lnRef>
+          <a:fillRef idx="1">
+            <a:schemeClr val="accent1"/>
+          </a:fillRef>
+          <a:effectRef idx="0">
+            <a:schemeClr val="accent1"/>
+          </a:effectRef>
+          <a:fontRef idx="minor">
+            <a:schemeClr val="lt1"/>
+          </a:fontRef>
+        </p:style>
+        <p:txBody>
+          <a:bodyPr rtlCol="0" anchor="ctr"/>
+          <a:lstStyle/>
+          <a:p>
+            <a:pPr algn="ctr"/>
+            <a:r>
+              <a:rPr lang="en-US" dirty="0"/>
+              <a:t>Choose Call Time</a:t>
+            </a:r>
+          </a:p>
+        </p:txBody>
+      </p:sp>
+      <p:sp>
+        <p:nvSpPr>
+          <p:cNvPr id="13" name="TextBox 12">
+            <a:extLst>
+              <a:ext uri="{FF2B5EF4-FFF2-40B4-BE49-F238E27FC236}">
+                <a16:creationId xmlns:a16="http://schemas.microsoft.com/office/drawing/2014/main" id="{66CCC6EE-6002-4BE0-A3DE-6BBC0F947F78}"/>
+              </a:ext>
+            </a:extLst>
+          </p:cNvPr>
+          <p:cNvSpPr txBox="1"/>
+          <p:nvPr/>
+        </p:nvSpPr>
+        <p:spPr>
+          <a:xfrm>
+            <a:off x="8212373" y="3663118"/>
+            <a:ext cx="2894275" cy="1077218"/>
+          </a:xfrm>
+          <a:prstGeom prst="rect">
+            <a:avLst/>
+          </a:prstGeom>
+          <a:noFill/>
+        </p:spPr>
+        <p:txBody>
+          <a:bodyPr wrap="square" rtlCol="0">
+            <a:spAutoFit/>
+          </a:bodyPr>
+          <a:lstStyle/>
+          <a:p>
+            <a:pPr marL="285750" indent="-285750">
+              <a:buFont typeface="Arial" panose="020B0604020202020204" pitchFamily="34" charset="0"/>
+              <a:buChar char="•"/>
+            </a:pPr>
+            <a:r>
+              <a:rPr lang="en-US" sz="1600" dirty="0"/>
+              <a:t>Rank options (5 DOW x 5 Hour-Windows) and match to Ranked Calls</a:t>
+            </a:r>
+          </a:p>
+          <a:p>
+            <a:pPr marL="285750" indent="-285750">
+              <a:buFont typeface="Arial" panose="020B0604020202020204" pitchFamily="34" charset="0"/>
+              <a:buChar char="•"/>
+            </a:pPr>
+            <a:r>
+              <a:rPr lang="en-US" sz="1600" dirty="0"/>
+              <a:t>Add </a:t>
+            </a:r>
+            <a:r>
+              <a:rPr lang="en-US" sz="1600" b="1" i="1" dirty="0">
+                <a:solidFill>
+                  <a:schemeClr val="accent2"/>
+                </a:solidFill>
+              </a:rPr>
+              <a:t>Jitter</a:t>
+            </a:r>
+          </a:p>
+        </p:txBody>
+      </p:sp>
+      <p:sp>
+        <p:nvSpPr>
+          <p:cNvPr id="14" name="TextBox 13">
+            <a:extLst>
+              <a:ext uri="{FF2B5EF4-FFF2-40B4-BE49-F238E27FC236}">
+                <a16:creationId xmlns:a16="http://schemas.microsoft.com/office/drawing/2014/main" id="{A831561A-D406-4512-BE28-8A975A4C9D31}"/>
+              </a:ext>
+            </a:extLst>
+          </p:cNvPr>
+          <p:cNvSpPr txBox="1"/>
+          <p:nvPr/>
+        </p:nvSpPr>
+        <p:spPr>
+          <a:xfrm>
+            <a:off x="5669278" y="6056697"/>
+            <a:ext cx="6114884" cy="584775"/>
+          </a:xfrm>
+          <a:prstGeom prst="rect">
+            <a:avLst/>
+          </a:prstGeom>
+          <a:noFill/>
+        </p:spPr>
+        <p:txBody>
+          <a:bodyPr wrap="square" rtlCol="0">
+            <a:spAutoFit/>
+          </a:bodyPr>
+          <a:lstStyle/>
+          <a:p>
+            <a:r>
+              <a:rPr lang="en-US" sz="1600" b="1" i="1" dirty="0">
+                <a:solidFill>
+                  <a:schemeClr val="accent2"/>
+                </a:solidFill>
+              </a:rPr>
+              <a:t>Rotation</a:t>
+            </a:r>
+            <a:r>
+              <a:rPr lang="en-US" sz="1600" dirty="0"/>
+              <a:t> introduced to control for self-fulfilling prophecies (e.g., Monday 1PM looks best because we always call best scores there)</a:t>
+            </a:r>
+          </a:p>
+        </p:txBody>
+      </p:sp>
+      <p:sp>
+        <p:nvSpPr>
+          <p:cNvPr id="16" name="TextBox 15">
+            <a:extLst>
+              <a:ext uri="{FF2B5EF4-FFF2-40B4-BE49-F238E27FC236}">
+                <a16:creationId xmlns:a16="http://schemas.microsoft.com/office/drawing/2014/main" id="{004A0B4B-C6A1-4F38-B200-93AC57C18A80}"/>
+              </a:ext>
+            </a:extLst>
+          </p:cNvPr>
+          <p:cNvSpPr txBox="1"/>
+          <p:nvPr/>
+        </p:nvSpPr>
+        <p:spPr>
+          <a:xfrm>
+            <a:off x="838200" y="1653859"/>
+            <a:ext cx="6779150" cy="400110"/>
+          </a:xfrm>
+          <a:prstGeom prst="rect">
+            <a:avLst/>
+          </a:prstGeom>
+          <a:noFill/>
+        </p:spPr>
+        <p:txBody>
+          <a:bodyPr wrap="square" rtlCol="0">
+            <a:spAutoFit/>
+          </a:bodyPr>
+          <a:lstStyle/>
+          <a:p>
+            <a:r>
+              <a:rPr lang="en-US" sz="2000" i="1" dirty="0"/>
+              <a:t>Specify who to call, what phones, and (roughly) when.</a:t>
+            </a:r>
+          </a:p>
+        </p:txBody>
+      </p:sp>
+    </p:spTree>
+    <p:extLst>
+      <p:ext uri="{BB962C8B-B14F-4D97-AF65-F5344CB8AC3E}">
+        <p14:creationId xmlns:p14="http://schemas.microsoft.com/office/powerpoint/2010/main" val="1580944030"/>
       </p:ext>
     </p:extLst>
   </p:cSld>

</xml_diff>